<commit_message>
Added documentation for sprint 3
</commit_message>
<xml_diff>
--- a/Documents/Documentation/Final Presentation.pptx
+++ b/Documents/Documentation/Final Presentation.pptx
@@ -10,6 +10,8 @@
     <p:sldId id="258" r:id="rId4"/>
     <p:sldId id="260" r:id="rId5"/>
     <p:sldId id="259" r:id="rId6"/>
+    <p:sldId id="263" r:id="rId7"/>
+    <p:sldId id="264" r:id="rId8"/>
   </p:sldIdLst>
   <p:sldSz cx="12192000" cy="6858000"/>
   <p:notesSz cx="6858000" cy="9144000"/>
@@ -108,6 +110,11 @@
       </a:defRPr>
     </a:lvl9pPr>
   </p:defaultTextStyle>
+  <p:extLst>
+    <p:ext uri="{EFAFB233-063F-42B5-8137-9DF3F51BA10A}">
+      <p15:sldGuideLst xmlns:p15="http://schemas.microsoft.com/office/powerpoint/2012/main"/>
+    </p:ext>
+  </p:extLst>
 </p:presentation>
 </file>
 
@@ -5094,22 +5101,38 @@
         <p:spPr>
           <a:xfrm>
             <a:off x="6917595" y="2792707"/>
-            <a:ext cx="4475892" cy="3042547"/>
+            <a:ext cx="4475892" cy="3356139"/>
           </a:xfrm>
         </p:spPr>
         <p:txBody>
           <a:bodyPr>
-            <a:normAutofit fontScale="92500" lnSpcReduction="20000"/>
+            <a:normAutofit fontScale="85000" lnSpcReduction="20000"/>
           </a:bodyPr>
           <a:lstStyle/>
           <a:p>
-            <a:pPr marL="342900" indent="-342900">
+            <a:pPr marL="0" indent="0">
+              <a:buClrTx/>
+              <a:buNone/>
+            </a:pPr>
+            <a:r>
+              <a:rPr lang="en-US" sz="2300" dirty="0">
+                <a:solidFill>
+                  <a:schemeClr val="accent1">
+                    <a:lumMod val="75000"/>
+                  </a:schemeClr>
+                </a:solidFill>
+              </a:rPr>
+              <a:t>DEVELOPMENT SPECIFIC</a:t>
+            </a:r>
+          </a:p>
+          <a:p>
+            <a:pPr marL="571500" lvl="1" indent="-342900">
               <a:buClrTx/>
               <a:buFont typeface="+mj-lt"/>
               <a:buAutoNum type="arabicPeriod"/>
             </a:pPr>
             <a:r>
-              <a:rPr lang="en-US" dirty="0">
+              <a:rPr lang="en-US" sz="1700" dirty="0">
                 <a:solidFill>
                   <a:schemeClr val="tx1"/>
                 </a:solidFill>
@@ -5118,51 +5141,24 @@
             </a:r>
           </a:p>
           <a:p>
-            <a:pPr marL="342900" indent="-342900">
+            <a:pPr marL="571500" lvl="1" indent="-342900">
               <a:buClrTx/>
               <a:buFont typeface="+mj-lt"/>
               <a:buAutoNum type="arabicPeriod"/>
             </a:pPr>
-            <a:endParaRPr lang="en-US" dirty="0">
-              <a:solidFill>
-                <a:schemeClr val="tx1"/>
-              </a:solidFill>
-            </a:endParaRPr>
-          </a:p>
-          <a:p>
-            <a:pPr marL="342900" indent="-342900">
+            <a:r>
+              <a:rPr lang="en-US" sz="1700" dirty="0">
+                <a:solidFill>
+                  <a:schemeClr val="tx1"/>
+                </a:solidFill>
+              </a:rPr>
+              <a:t>Applied agile development practices for the first time</a:t>
+            </a:r>
+          </a:p>
+          <a:p>
+            <a:pPr marL="0" indent="0">
               <a:buClrTx/>
-              <a:buFont typeface="+mj-lt"/>
-              <a:buAutoNum type="arabicPeriod"/>
-            </a:pPr>
-            <a:r>
-              <a:rPr lang="en-US" dirty="0">
-                <a:solidFill>
-                  <a:schemeClr val="tx1"/>
-                </a:solidFill>
-              </a:rPr>
-              <a:t>Developed an intuitive user interface</a:t>
-            </a:r>
-          </a:p>
-          <a:p>
-            <a:pPr marL="342900" indent="-342900">
-              <a:buClrTx/>
-              <a:buFont typeface="+mj-lt"/>
-              <a:buAutoNum type="arabicPeriod"/>
-            </a:pPr>
-            <a:endParaRPr lang="en-US" dirty="0">
-              <a:solidFill>
-                <a:schemeClr val="tx1"/>
-              </a:solidFill>
-            </a:endParaRPr>
-          </a:p>
-          <a:p>
-            <a:pPr marL="342900" indent="-342900">
-              <a:buClr>
-                <a:schemeClr val="bg1"/>
-              </a:buClr>
-              <a:buFont typeface="+mj-lt"/>
-              <a:buAutoNum type="arabicPeriod"/>
+              <a:buNone/>
             </a:pPr>
             <a:endParaRPr lang="en-US" sz="800" dirty="0">
               <a:solidFill>
@@ -5171,33 +5167,35 @@
             </a:endParaRPr>
           </a:p>
           <a:p>
+            <a:pPr marL="0" indent="0">
+              <a:buClrTx/>
+              <a:buNone/>
+            </a:pPr>
+            <a:r>
+              <a:rPr lang="en-US" sz="2100" dirty="0">
+                <a:solidFill>
+                  <a:schemeClr val="accent1">
+                    <a:lumMod val="75000"/>
+                  </a:schemeClr>
+                </a:solidFill>
+              </a:rPr>
+              <a:t>PROJECT SPECIFC</a:t>
+            </a:r>
+          </a:p>
+          <a:p>
             <a:pPr marL="342900" indent="-342900">
               <a:buClrTx/>
               <a:buFont typeface="+mj-lt"/>
               <a:buAutoNum type="arabicPeriod"/>
             </a:pPr>
             <a:r>
-              <a:rPr lang="en-US" dirty="0">
+              <a:rPr lang="en-US" sz="1700" dirty="0">
                 <a:solidFill>
                   <a:schemeClr val="tx1"/>
                 </a:solidFill>
               </a:rPr>
-              <a:t>Be able to define scalar values through an easily accessible part of the website.</a:t>
-            </a:r>
-          </a:p>
-          <a:p>
-            <a:pPr marL="342900" indent="-342900">
-              <a:buClr>
-                <a:schemeClr val="bg1"/>
-              </a:buClr>
-              <a:buFont typeface="+mj-lt"/>
-              <a:buAutoNum type="arabicPeriod"/>
-            </a:pPr>
-            <a:endParaRPr lang="en-US" sz="800" dirty="0">
-              <a:solidFill>
-                <a:schemeClr val="tx1"/>
-              </a:solidFill>
-            </a:endParaRPr>
+              <a:t>Developed an intuitive user interface</a:t>
+            </a:r>
           </a:p>
           <a:p>
             <a:pPr marL="342900" indent="-342900">
@@ -5206,12 +5204,42 @@
               <a:buAutoNum type="arabicPeriod"/>
             </a:pPr>
             <a:r>
-              <a:rPr lang="en-US" dirty="0">
+              <a:rPr lang="en-US" sz="1700" dirty="0">
                 <a:solidFill>
                   <a:schemeClr val="tx1"/>
                 </a:solidFill>
               </a:rPr>
-              <a:t>Be able to apply multiple defined matrices to the 3D model in the viewing area.</a:t>
+              <a:t>Developed an usable mathematical expression parser</a:t>
+            </a:r>
+          </a:p>
+          <a:p>
+            <a:pPr marL="342900" indent="-342900">
+              <a:buClrTx/>
+              <a:buFont typeface="+mj-lt"/>
+              <a:buAutoNum type="arabicPeriod"/>
+            </a:pPr>
+            <a:r>
+              <a:rPr lang="en-US" sz="1700" dirty="0">
+                <a:solidFill>
+                  <a:schemeClr val="tx1"/>
+                </a:solidFill>
+              </a:rPr>
+              <a:t>Developed a 3D viewing area with external functionality</a:t>
+            </a:r>
+          </a:p>
+          <a:p>
+            <a:pPr marL="342900" indent="-342900">
+              <a:buClrTx/>
+              <a:buFont typeface="+mj-lt"/>
+              <a:buAutoNum type="arabicPeriod"/>
+            </a:pPr>
+            <a:r>
+              <a:rPr lang="en-US" sz="1700" dirty="0">
+                <a:solidFill>
+                  <a:schemeClr val="tx1"/>
+                </a:solidFill>
+              </a:rPr>
+              <a:t>Applied agile development practices for the first time</a:t>
             </a:r>
           </a:p>
         </p:txBody>
@@ -5231,7 +5259,7 @@
         <p:spPr>
           <a:xfrm>
             <a:off x="844680" y="2792707"/>
-            <a:ext cx="4475892" cy="3385542"/>
+            <a:ext cx="4475892" cy="3785652"/>
           </a:xfrm>
           <a:prstGeom prst="rect">
             <a:avLst/>
@@ -5244,7 +5272,19 @@
           </a:bodyPr>
           <a:lstStyle/>
           <a:p>
-            <a:pPr marL="342900" indent="-342900">
+            <a:r>
+              <a:rPr lang="en-US" dirty="0">
+                <a:solidFill>
+                  <a:schemeClr val="accent2">
+                    <a:lumMod val="50000"/>
+                  </a:schemeClr>
+                </a:solidFill>
+              </a:rPr>
+              <a:t>DEVELOPMENT SPECIFIC</a:t>
+            </a:r>
+          </a:p>
+          <a:p>
+            <a:pPr marL="800100" lvl="1" indent="-342900">
               <a:buFont typeface="+mj-lt"/>
               <a:buAutoNum type="arabicPeriod"/>
             </a:pPr>
@@ -5269,6 +5309,18 @@
             </a:endParaRPr>
           </a:p>
           <a:p>
+            <a:r>
+              <a:rPr lang="en-US" dirty="0">
+                <a:solidFill>
+                  <a:schemeClr val="accent2">
+                    <a:lumMod val="50000"/>
+                  </a:schemeClr>
+                </a:solidFill>
+              </a:rPr>
+              <a:t>PROJECT SPECFIC</a:t>
+            </a:r>
+          </a:p>
+          <a:p>
             <a:pPr marL="342900" indent="-342900">
               <a:buFont typeface="+mj-lt"/>
               <a:buAutoNum type="arabicPeriod"/>
@@ -5280,7 +5332,7 @@
             </a:endParaRPr>
           </a:p>
           <a:p>
-            <a:pPr marL="342900" indent="-342900">
+            <a:pPr marL="800100" lvl="1" indent="-342900">
               <a:buFont typeface="+mj-lt"/>
               <a:buAutoNum type="arabicPeriod"/>
             </a:pPr>
@@ -5294,20 +5346,30 @@
             </a:r>
           </a:p>
           <a:p>
-            <a:pPr marL="342900" indent="-342900">
-              <a:buFont typeface="+mj-lt"/>
-              <a:buAutoNum type="arabicPeriod"/>
-            </a:pPr>
-            <a:endParaRPr lang="en-US" dirty="0">
+            <a:endParaRPr lang="en-US" sz="800" dirty="0">
               <a:solidFill>
                 <a:schemeClr val="bg1"/>
               </a:solidFill>
             </a:endParaRPr>
           </a:p>
           <a:p>
-            <a:pPr marL="342900" indent="-342900">
+            <a:pPr marL="800100" lvl="1" indent="-342900">
               <a:buFont typeface="+mj-lt"/>
-              <a:buAutoNum type="arabicPeriod"/>
+              <a:buAutoNum type="arabicPeriod" startAt="2"/>
+            </a:pPr>
+            <a:r>
+              <a:rPr lang="en-US" dirty="0">
+                <a:solidFill>
+                  <a:schemeClr val="bg1"/>
+                </a:solidFill>
+              </a:rPr>
+              <a:t>Being able to understand mathematical expressions</a:t>
+            </a:r>
+          </a:p>
+          <a:p>
+            <a:pPr marL="800100" lvl="1" indent="-342900">
+              <a:buFont typeface="+mj-lt"/>
+              <a:buAutoNum type="arabicPeriod" startAt="2"/>
             </a:pPr>
             <a:endParaRPr lang="en-US" sz="800" dirty="0">
               <a:solidFill>
@@ -5316,9 +5378,9 @@
             </a:endParaRPr>
           </a:p>
           <a:p>
-            <a:pPr marL="342900" indent="-342900">
+            <a:pPr marL="800100" lvl="1" indent="-342900">
               <a:buFont typeface="+mj-lt"/>
-              <a:buAutoNum type="arabicPeriod"/>
+              <a:buAutoNum type="arabicPeriod" startAt="2"/>
             </a:pPr>
             <a:r>
               <a:rPr lang="en-US" dirty="0">
@@ -5326,32 +5388,7 @@
                   <a:schemeClr val="bg1"/>
                 </a:solidFill>
               </a:rPr>
-              <a:t>Being able to understand mathematical expressions</a:t>
-            </a:r>
-          </a:p>
-          <a:p>
-            <a:pPr marL="342900" indent="-342900">
-              <a:buFont typeface="+mj-lt"/>
-              <a:buAutoNum type="arabicPeriod"/>
-            </a:pPr>
-            <a:endParaRPr lang="en-US" dirty="0">
-              <a:solidFill>
-                <a:schemeClr val="bg1"/>
-              </a:solidFill>
-            </a:endParaRPr>
-          </a:p>
-          <a:p>
-            <a:pPr marL="342900" indent="-342900">
-              <a:buFont typeface="+mj-lt"/>
-              <a:buAutoNum type="arabicPeriod"/>
-            </a:pPr>
-            <a:r>
-              <a:rPr lang="en-US" dirty="0">
-                <a:solidFill>
-                  <a:schemeClr val="bg1"/>
-                </a:solidFill>
-              </a:rPr>
-              <a:t>Developing a 3D viewing space</a:t>
+              <a:t>External functionality within the 3D viewing area</a:t>
             </a:r>
           </a:p>
           <a:p>
@@ -5402,51 +5439,103 @@
       </p:grpSpPr>
       <p:sp>
         <p:nvSpPr>
-          <p:cNvPr id="2" name="Title 1">
+          <p:cNvPr id="6" name="Title 1">
             <a:extLst>
               <a:ext uri="{FF2B5EF4-FFF2-40B4-BE49-F238E27FC236}">
-                <a16:creationId xmlns:a16="http://schemas.microsoft.com/office/drawing/2014/main" id="{6B1B3697-98F6-4A82-8303-0FA757038AA5}"/>
+                <a16:creationId xmlns:a16="http://schemas.microsoft.com/office/drawing/2014/main" id="{AA97616C-7D04-4F06-AA5E-78FEE643F2AF}"/>
               </a:ext>
             </a:extLst>
           </p:cNvPr>
-          <p:cNvSpPr>
-            <a:spLocks noGrp="1"/>
-          </p:cNvSpPr>
-          <p:nvPr>
-            <p:ph type="title"/>
-          </p:nvPr>
-        </p:nvSpPr>
-        <p:spPr/>
-        <p:txBody>
-          <a:bodyPr/>
-          <a:lstStyle/>
-          <a:p>
-            <a:endParaRPr lang="en-US"/>
-          </a:p>
-        </p:txBody>
-      </p:sp>
-      <p:sp>
-        <p:nvSpPr>
-          <p:cNvPr id="3" name="Content Placeholder 2">
+          <p:cNvSpPr txBox="1">
+            <a:spLocks/>
+          </p:cNvSpPr>
+          <p:nvPr/>
+        </p:nvSpPr>
+        <p:spPr bwMode="black">
+          <a:xfrm>
+            <a:off x="358140" y="209296"/>
+            <a:ext cx="3380740" cy="1568704"/>
+          </a:xfrm>
+          <a:prstGeom prst="rect">
+            <a:avLst/>
+          </a:prstGeom>
+          <a:noFill/>
+          <a:ln w="31750" cap="sq">
+            <a:noFill/>
+            <a:miter lim="800000"/>
+          </a:ln>
+        </p:spPr>
+        <p:txBody>
+          <a:bodyPr vert="horz" lIns="182880" tIns="182880" rIns="182880" bIns="182880" rtlCol="0" anchor="ctr">
+            <a:normAutofit/>
+          </a:bodyPr>
+          <a:lstStyle>
+            <a:lvl1pPr algn="ctr" defTabSz="914400" rtl="0" eaLnBrk="1" latinLnBrk="0" hangingPunct="1">
+              <a:lnSpc>
+                <a:spcPct val="90000"/>
+              </a:lnSpc>
+              <a:spcBef>
+                <a:spcPct val="0"/>
+              </a:spcBef>
+              <a:buNone/>
+              <a:defRPr sz="2800" kern="1200" cap="all" spc="200" baseline="0">
+                <a:solidFill>
+                  <a:srgbClr val="262626"/>
+                </a:solidFill>
+                <a:latin typeface="+mj-lt"/>
+                <a:ea typeface="+mj-ea"/>
+                <a:cs typeface="+mj-cs"/>
+              </a:defRPr>
+            </a:lvl1pPr>
+          </a:lstStyle>
+          <a:p>
+            <a:r>
+              <a:rPr lang="en-US" sz="5400" dirty="0"/>
+              <a:t>[MAT3D]</a:t>
+            </a:r>
+            <a:br>
+              <a:rPr lang="en-US" sz="6600" dirty="0"/>
+            </a:br>
+            <a:r>
+              <a:rPr lang="en-US" sz="2000" dirty="0"/>
+              <a:t>by Matrix Masters</a:t>
+            </a:r>
+          </a:p>
+        </p:txBody>
+      </p:sp>
+      <p:sp>
+        <p:nvSpPr>
+          <p:cNvPr id="7" name="TextBox 6">
             <a:extLst>
               <a:ext uri="{FF2B5EF4-FFF2-40B4-BE49-F238E27FC236}">
-                <a16:creationId xmlns:a16="http://schemas.microsoft.com/office/drawing/2014/main" id="{B0F43D1E-255B-44FE-AE8F-C14249282280}"/>
+                <a16:creationId xmlns:a16="http://schemas.microsoft.com/office/drawing/2014/main" id="{A90A3416-DAAE-4247-B056-16923C550318}"/>
               </a:ext>
             </a:extLst>
           </p:cNvPr>
-          <p:cNvSpPr>
-            <a:spLocks noGrp="1"/>
-          </p:cNvSpPr>
-          <p:nvPr>
-            <p:ph idx="1"/>
-          </p:nvPr>
-        </p:nvSpPr>
-        <p:spPr/>
-        <p:txBody>
-          <a:bodyPr/>
-          <a:lstStyle/>
-          <a:p>
-            <a:endParaRPr lang="en-US"/>
+          <p:cNvSpPr txBox="1"/>
+          <p:nvPr/>
+        </p:nvSpPr>
+        <p:spPr>
+          <a:xfrm>
+            <a:off x="2534920" y="2644170"/>
+            <a:ext cx="7122160" cy="1569660"/>
+          </a:xfrm>
+          <a:prstGeom prst="rect">
+            <a:avLst/>
+          </a:prstGeom>
+          <a:noFill/>
+        </p:spPr>
+        <p:txBody>
+          <a:bodyPr wrap="square" rtlCol="0">
+            <a:spAutoFit/>
+          </a:bodyPr>
+          <a:lstStyle/>
+          <a:p>
+            <a:pPr algn="ctr"/>
+            <a:r>
+              <a:rPr lang="en-US" sz="9600" dirty="0"/>
+              <a:t>LIVE DEMO</a:t>
+            </a:r>
           </a:p>
         </p:txBody>
       </p:sp>
@@ -5454,6 +5543,497 @@
     <p:extLst>
       <p:ext uri="{BB962C8B-B14F-4D97-AF65-F5344CB8AC3E}">
         <p14:creationId xmlns:p14="http://schemas.microsoft.com/office/powerpoint/2010/main" val="2233887437"/>
+      </p:ext>
+    </p:extLst>
+  </p:cSld>
+  <p:clrMapOvr>
+    <a:masterClrMapping/>
+  </p:clrMapOvr>
+</p:sld>
+</file>
+
+<file path=ppt/slides/slide6.xml><?xml version="1.0" encoding="utf-8"?>
+<p:sld xmlns:a="http://schemas.openxmlformats.org/drawingml/2006/main" xmlns:r="http://schemas.openxmlformats.org/officeDocument/2006/relationships" xmlns:p="http://schemas.openxmlformats.org/presentationml/2006/main">
+  <p:cSld>
+    <p:bg>
+      <p:bgPr>
+        <a:solidFill>
+          <a:schemeClr val="accent2"/>
+        </a:solidFill>
+        <a:effectLst/>
+      </p:bgPr>
+    </p:bg>
+    <p:spTree>
+      <p:nvGrpSpPr>
+        <p:cNvPr id="1" name=""/>
+        <p:cNvGrpSpPr/>
+        <p:nvPr/>
+      </p:nvGrpSpPr>
+      <p:grpSpPr>
+        <a:xfrm>
+          <a:off x="0" y="0"/>
+          <a:ext cx="0" cy="0"/>
+          <a:chOff x="0" y="0"/>
+          <a:chExt cx="0" cy="0"/>
+        </a:xfrm>
+      </p:grpSpPr>
+      <p:sp>
+        <p:nvSpPr>
+          <p:cNvPr id="2" name="Title 1">
+            <a:extLst>
+              <a:ext uri="{FF2B5EF4-FFF2-40B4-BE49-F238E27FC236}">
+                <a16:creationId xmlns:a16="http://schemas.microsoft.com/office/drawing/2014/main" id="{322E2055-0BBF-43BB-A931-8D1EEB132577}"/>
+              </a:ext>
+            </a:extLst>
+          </p:cNvPr>
+          <p:cNvSpPr>
+            <a:spLocks noGrp="1"/>
+          </p:cNvSpPr>
+          <p:nvPr>
+            <p:ph type="title"/>
+          </p:nvPr>
+        </p:nvSpPr>
+        <p:spPr>
+          <a:xfrm>
+            <a:off x="734122" y="802638"/>
+            <a:ext cx="3698803" cy="1440394"/>
+          </a:xfrm>
+          <a:noFill/>
+          <a:ln>
+            <a:solidFill>
+              <a:schemeClr val="tx1"/>
+            </a:solidFill>
+          </a:ln>
+        </p:spPr>
+        <p:txBody>
+          <a:bodyPr>
+            <a:normAutofit/>
+          </a:bodyPr>
+          <a:lstStyle/>
+          <a:p>
+            <a:r>
+              <a:rPr lang="en-US" sz="2400" dirty="0">
+                <a:solidFill>
+                  <a:schemeClr val="tx1"/>
+                </a:solidFill>
+              </a:rPr>
+              <a:t>System overview</a:t>
+            </a:r>
+          </a:p>
+        </p:txBody>
+      </p:sp>
+      <p:sp>
+        <p:nvSpPr>
+          <p:cNvPr id="8" name="Rectangle 7">
+            <a:extLst>
+              <a:ext uri="{FF2B5EF4-FFF2-40B4-BE49-F238E27FC236}">
+                <a16:creationId xmlns:a16="http://schemas.microsoft.com/office/drawing/2014/main" id="{FB403EBD-907E-4D59-98D4-A72CD1063C62}"/>
+              </a:ext>
+              <a:ext uri="{C183D7F6-B498-43B3-948B-1728B52AA6E4}">
+                <adec:decorative xmlns:adec="http://schemas.microsoft.com/office/drawing/2017/decorative" val="1"/>
+              </a:ext>
+            </a:extLst>
+          </p:cNvPr>
+          <p:cNvSpPr>
+            <a:spLocks noGrp="1" noRot="1" noChangeAspect="1" noMove="1" noResize="1" noEditPoints="1" noAdjustHandles="1" noChangeArrowheads="1" noChangeShapeType="1" noTextEdit="1"/>
+          </p:cNvSpPr>
+          <p:nvPr>
+            <p:extLst>
+              <p:ext uri="{386F3935-93C4-4BCD-93E2-E3B085C9AB24}">
+                <p16:designElem xmlns:p16="http://schemas.microsoft.com/office/powerpoint/2015/main" val="1"/>
+              </p:ext>
+            </p:extLst>
+          </p:nvPr>
+        </p:nvSpPr>
+        <p:spPr>
+          <a:xfrm>
+            <a:off x="5315061" y="-2"/>
+            <a:ext cx="6876939" cy="6858002"/>
+          </a:xfrm>
+          <a:prstGeom prst="rect">
+            <a:avLst/>
+          </a:prstGeom>
+          <a:solidFill>
+            <a:schemeClr val="tx1">
+              <a:lumMod val="95000"/>
+            </a:schemeClr>
+          </a:solidFill>
+          <a:ln>
+            <a:noFill/>
+          </a:ln>
+        </p:spPr>
+        <p:style>
+          <a:lnRef idx="2">
+            <a:schemeClr val="accent1">
+              <a:shade val="50000"/>
+            </a:schemeClr>
+          </a:lnRef>
+          <a:fillRef idx="1">
+            <a:schemeClr val="accent1"/>
+          </a:fillRef>
+          <a:effectRef idx="0">
+            <a:schemeClr val="accent1"/>
+          </a:effectRef>
+          <a:fontRef idx="minor">
+            <a:schemeClr val="lt1"/>
+          </a:fontRef>
+        </p:style>
+        <p:txBody>
+          <a:bodyPr rtlCol="0" anchor="ctr"/>
+          <a:lstStyle/>
+          <a:p>
+            <a:pPr algn="ctr"/>
+            <a:endParaRPr lang="en-US"/>
+          </a:p>
+        </p:txBody>
+      </p:sp>
+      <p:pic>
+        <p:nvPicPr>
+          <p:cNvPr id="6" name="Picture 5" descr="A screenshot of a cell phone&#10;&#10;Description generated with very high confidence">
+            <a:extLst>
+              <a:ext uri="{FF2B5EF4-FFF2-40B4-BE49-F238E27FC236}">
+                <a16:creationId xmlns:a16="http://schemas.microsoft.com/office/drawing/2014/main" id="{8B3D269B-F6BF-44C4-8936-0E200A0B1AE4}"/>
+              </a:ext>
+            </a:extLst>
+          </p:cNvPr>
+          <p:cNvPicPr>
+            <a:picLocks noChangeAspect="1"/>
+          </p:cNvPicPr>
+          <p:nvPr/>
+        </p:nvPicPr>
+        <p:blipFill>
+          <a:blip r:embed="rId2"/>
+          <a:stretch>
+            <a:fillRect/>
+          </a:stretch>
+        </p:blipFill>
+        <p:spPr>
+          <a:xfrm>
+            <a:off x="5686480" y="509587"/>
+            <a:ext cx="6134100" cy="6029325"/>
+          </a:xfrm>
+          <a:prstGeom prst="rect">
+            <a:avLst/>
+          </a:prstGeom>
+        </p:spPr>
+      </p:pic>
+      <p:sp>
+        <p:nvSpPr>
+          <p:cNvPr id="7" name="TextBox 6">
+            <a:extLst>
+              <a:ext uri="{FF2B5EF4-FFF2-40B4-BE49-F238E27FC236}">
+                <a16:creationId xmlns:a16="http://schemas.microsoft.com/office/drawing/2014/main" id="{3CD25D49-B1AF-4ADB-A9A8-840252A2DA13}"/>
+              </a:ext>
+            </a:extLst>
+          </p:cNvPr>
+          <p:cNvSpPr txBox="1"/>
+          <p:nvPr/>
+        </p:nvSpPr>
+        <p:spPr>
+          <a:xfrm>
+            <a:off x="734122" y="2619767"/>
+            <a:ext cx="4209519" cy="3693319"/>
+          </a:xfrm>
+          <a:prstGeom prst="rect">
+            <a:avLst/>
+          </a:prstGeom>
+          <a:noFill/>
+        </p:spPr>
+        <p:txBody>
+          <a:bodyPr wrap="square" rtlCol="0">
+            <a:spAutoFit/>
+          </a:bodyPr>
+          <a:lstStyle/>
+          <a:p>
+            <a:r>
+              <a:rPr lang="en-US" sz="2400" dirty="0"/>
+              <a:t>LANGUAGES:</a:t>
+            </a:r>
+          </a:p>
+          <a:p>
+            <a:pPr marL="285750" indent="-285750">
+              <a:buFont typeface="Arial" panose="020B0604020202020204" pitchFamily="34" charset="0"/>
+              <a:buChar char="•"/>
+            </a:pPr>
+            <a:r>
+              <a:rPr lang="en-US" dirty="0"/>
+              <a:t>JavaScript</a:t>
+            </a:r>
+          </a:p>
+          <a:p>
+            <a:pPr marL="285750" indent="-285750">
+              <a:buFont typeface="Arial" panose="020B0604020202020204" pitchFamily="34" charset="0"/>
+              <a:buChar char="•"/>
+            </a:pPr>
+            <a:r>
+              <a:rPr lang="en-US" dirty="0"/>
+              <a:t>HTML</a:t>
+            </a:r>
+          </a:p>
+          <a:p>
+            <a:pPr marL="285750" indent="-285750">
+              <a:buFont typeface="Arial" panose="020B0604020202020204" pitchFamily="34" charset="0"/>
+              <a:buChar char="•"/>
+            </a:pPr>
+            <a:r>
+              <a:rPr lang="en-US" dirty="0"/>
+              <a:t>Python</a:t>
+            </a:r>
+          </a:p>
+          <a:p>
+            <a:pPr marL="285750" indent="-285750">
+              <a:buFont typeface="Arial" panose="020B0604020202020204" pitchFamily="34" charset="0"/>
+              <a:buChar char="•"/>
+            </a:pPr>
+            <a:endParaRPr lang="en-US" dirty="0"/>
+          </a:p>
+          <a:p>
+            <a:r>
+              <a:rPr lang="en-US" sz="2400" dirty="0"/>
+              <a:t>EXTERNAL LIBRARIES</a:t>
+            </a:r>
+          </a:p>
+          <a:p>
+            <a:pPr marL="285750" indent="-285750">
+              <a:buFont typeface="Arial" panose="020B0604020202020204" pitchFamily="34" charset="0"/>
+              <a:buChar char="•"/>
+            </a:pPr>
+            <a:r>
+              <a:rPr lang="en-US" dirty="0"/>
+              <a:t>Math.js (Math Library)</a:t>
+            </a:r>
+          </a:p>
+          <a:p>
+            <a:pPr marL="285750" indent="-285750">
+              <a:buFont typeface="Arial" panose="020B0604020202020204" pitchFamily="34" charset="0"/>
+              <a:buChar char="•"/>
+            </a:pPr>
+            <a:r>
+              <a:rPr lang="en-US" dirty="0"/>
+              <a:t>Three.js (Graphics Library)</a:t>
+            </a:r>
+          </a:p>
+          <a:p>
+            <a:pPr marL="285750" indent="-285750">
+              <a:buFont typeface="Arial" panose="020B0604020202020204" pitchFamily="34" charset="0"/>
+              <a:buChar char="•"/>
+            </a:pPr>
+            <a:endParaRPr lang="en-US" dirty="0"/>
+          </a:p>
+          <a:p>
+            <a:r>
+              <a:rPr lang="en-US" sz="2400" dirty="0"/>
+              <a:t>FRAMEWORKS</a:t>
+            </a:r>
+          </a:p>
+          <a:p>
+            <a:pPr marL="285750" indent="-285750">
+              <a:buFont typeface="Arial" panose="020B0604020202020204" pitchFamily="34" charset="0"/>
+              <a:buChar char="•"/>
+            </a:pPr>
+            <a:r>
+              <a:rPr lang="en-US" dirty="0"/>
+              <a:t>Web2Py (Web Hosting)</a:t>
+            </a:r>
+          </a:p>
+          <a:p>
+            <a:pPr marL="285750" indent="-285750">
+              <a:buFont typeface="Arial" panose="020B0604020202020204" pitchFamily="34" charset="0"/>
+              <a:buChar char="•"/>
+            </a:pPr>
+            <a:r>
+              <a:rPr lang="en-US" dirty="0"/>
+              <a:t>Vue.js (User Interface)</a:t>
+            </a:r>
+          </a:p>
+        </p:txBody>
+      </p:sp>
+    </p:spTree>
+    <p:extLst>
+      <p:ext uri="{BB962C8B-B14F-4D97-AF65-F5344CB8AC3E}">
+        <p14:creationId xmlns:p14="http://schemas.microsoft.com/office/powerpoint/2010/main" val="1845993192"/>
+      </p:ext>
+    </p:extLst>
+  </p:cSld>
+  <p:clrMapOvr>
+    <a:overrideClrMapping bg1="dk1" tx1="lt1" bg2="dk2" tx2="lt2" accent1="accent1" accent2="accent2" accent3="accent3" accent4="accent4" accent5="accent5" accent6="accent6" hlink="hlink" folHlink="folHlink"/>
+  </p:clrMapOvr>
+</p:sld>
+</file>
+
+<file path=ppt/slides/slide7.xml><?xml version="1.0" encoding="utf-8"?>
+<p:sld xmlns:a="http://schemas.openxmlformats.org/drawingml/2006/main" xmlns:r="http://schemas.openxmlformats.org/officeDocument/2006/relationships" xmlns:p="http://schemas.openxmlformats.org/presentationml/2006/main">
+  <p:cSld>
+    <p:bg>
+      <p:bgPr>
+        <a:solidFill>
+          <a:schemeClr val="bg1">
+            <a:lumMod val="95000"/>
+          </a:schemeClr>
+        </a:solidFill>
+        <a:effectLst/>
+      </p:bgPr>
+    </p:bg>
+    <p:spTree>
+      <p:nvGrpSpPr>
+        <p:cNvPr id="1" name=""/>
+        <p:cNvGrpSpPr/>
+        <p:nvPr/>
+      </p:nvGrpSpPr>
+      <p:grpSpPr>
+        <a:xfrm>
+          <a:off x="0" y="0"/>
+          <a:ext cx="0" cy="0"/>
+          <a:chOff x="0" y="0"/>
+          <a:chExt cx="0" cy="0"/>
+        </a:xfrm>
+      </p:grpSpPr>
+      <p:sp>
+        <p:nvSpPr>
+          <p:cNvPr id="2" name="Title 1">
+            <a:extLst>
+              <a:ext uri="{FF2B5EF4-FFF2-40B4-BE49-F238E27FC236}">
+                <a16:creationId xmlns:a16="http://schemas.microsoft.com/office/drawing/2014/main" id="{2B8E2110-48A0-42AD-9F49-5F60FFCE3181}"/>
+              </a:ext>
+            </a:extLst>
+          </p:cNvPr>
+          <p:cNvSpPr>
+            <a:spLocks noGrp="1"/>
+          </p:cNvSpPr>
+          <p:nvPr>
+            <p:ph type="title"/>
+          </p:nvPr>
+        </p:nvSpPr>
+        <p:spPr>
+          <a:xfrm>
+            <a:off x="845118" y="736092"/>
+            <a:ext cx="4379439" cy="1664208"/>
+          </a:xfrm>
+          <a:prstGeom prst="rect">
+            <a:avLst/>
+          </a:prstGeom>
+          <a:solidFill>
+            <a:schemeClr val="accent2"/>
+          </a:solidFill>
+          <a:ln w="190500" cap="sq" cmpd="thinThick">
+            <a:solidFill>
+              <a:schemeClr val="accent2"/>
+            </a:solidFill>
+            <a:miter lim="800000"/>
+          </a:ln>
+        </p:spPr>
+        <p:txBody>
+          <a:bodyPr wrap="square" anchor="ctr">
+            <a:normAutofit/>
+          </a:bodyPr>
+          <a:lstStyle/>
+          <a:p>
+            <a:r>
+              <a:rPr lang="en-US" dirty="0">
+                <a:solidFill>
+                  <a:srgbClr val="FFFFFF"/>
+                </a:solidFill>
+              </a:rPr>
+              <a:t>PROJECT MANAGEMENT:</a:t>
+            </a:r>
+            <a:br>
+              <a:rPr lang="en-US" dirty="0">
+                <a:solidFill>
+                  <a:srgbClr val="FFFFFF"/>
+                </a:solidFill>
+              </a:rPr>
+            </a:br>
+            <a:r>
+              <a:rPr lang="en-US" dirty="0">
+                <a:solidFill>
+                  <a:schemeClr val="tx2">
+                    <a:lumMod val="50000"/>
+                  </a:schemeClr>
+                </a:solidFill>
+              </a:rPr>
+              <a:t>HOW IT was DONE</a:t>
+            </a:r>
+          </a:p>
+        </p:txBody>
+      </p:sp>
+      <p:sp>
+        <p:nvSpPr>
+          <p:cNvPr id="4" name="TextBox 3">
+            <a:extLst>
+              <a:ext uri="{FF2B5EF4-FFF2-40B4-BE49-F238E27FC236}">
+                <a16:creationId xmlns:a16="http://schemas.microsoft.com/office/drawing/2014/main" id="{EC372F3A-93C2-407D-B6B3-D5ACF7862E26}"/>
+              </a:ext>
+            </a:extLst>
+          </p:cNvPr>
+          <p:cNvSpPr txBox="1"/>
+          <p:nvPr/>
+        </p:nvSpPr>
+        <p:spPr>
+          <a:xfrm>
+            <a:off x="6455343" y="736092"/>
+            <a:ext cx="4379439" cy="523220"/>
+          </a:xfrm>
+          <a:prstGeom prst="rect">
+            <a:avLst/>
+          </a:prstGeom>
+          <a:noFill/>
+        </p:spPr>
+        <p:txBody>
+          <a:bodyPr wrap="square" rtlCol="0">
+            <a:spAutoFit/>
+          </a:bodyPr>
+          <a:lstStyle/>
+          <a:p>
+            <a:pPr algn="ctr"/>
+            <a:r>
+              <a:rPr lang="en-US" sz="2800" dirty="0">
+                <a:solidFill>
+                  <a:schemeClr val="tx2">
+                    <a:lumMod val="50000"/>
+                  </a:schemeClr>
+                </a:solidFill>
+              </a:rPr>
+              <a:t>Agile Software Development</a:t>
+            </a:r>
+          </a:p>
+        </p:txBody>
+      </p:sp>
+      <p:sp>
+        <p:nvSpPr>
+          <p:cNvPr id="5" name="TextBox 4">
+            <a:extLst>
+              <a:ext uri="{FF2B5EF4-FFF2-40B4-BE49-F238E27FC236}">
+                <a16:creationId xmlns:a16="http://schemas.microsoft.com/office/drawing/2014/main" id="{D1BBDDC2-F009-4924-8A5D-E40BE3B2FA98}"/>
+              </a:ext>
+            </a:extLst>
+          </p:cNvPr>
+          <p:cNvSpPr txBox="1"/>
+          <p:nvPr/>
+        </p:nvSpPr>
+        <p:spPr>
+          <a:xfrm>
+            <a:off x="6296025" y="1524000"/>
+            <a:ext cx="4538757" cy="4705350"/>
+          </a:xfrm>
+          <a:prstGeom prst="rect">
+            <a:avLst/>
+          </a:prstGeom>
+          <a:noFill/>
+        </p:spPr>
+        <p:txBody>
+          <a:bodyPr wrap="square" rtlCol="0">
+            <a:spAutoFit/>
+          </a:bodyPr>
+          <a:lstStyle/>
+          <a:p>
+            <a:endParaRPr lang="en-US"/>
+          </a:p>
+        </p:txBody>
+      </p:sp>
+    </p:spTree>
+    <p:extLst>
+      <p:ext uri="{BB962C8B-B14F-4D97-AF65-F5344CB8AC3E}">
+        <p14:creationId xmlns:p14="http://schemas.microsoft.com/office/powerpoint/2010/main" val="2291112103"/>
       </p:ext>
     </p:extLst>
   </p:cSld>

</xml_diff>